<commit_message>
updated präsi, usecases, funktionsstruktur
</commit_message>
<xml_diff>
--- a/Meilenstein 2/Präsentation/Präsentation MS2.pptx
+++ b/Meilenstein 2/Präsentation/Präsentation MS2.pptx
@@ -4869,7 +4869,7 @@
           <a:graphicData uri="http://schemas.openxmlformats.org/presentationml/2006/ole">
             <mc:AlternateContent xmlns:mc="http://schemas.openxmlformats.org/markup-compatibility/2006">
               <mc:Choice xmlns:v="urn:schemas-microsoft-com:vml" Requires="v">
-                <p:oleObj spid="_x0000_s1026" name="Acrobat Document" r:id="rId3" imgW="6415686" imgH="4533529" progId="AcroExch.Document.DC">
+                <p:oleObj spid="_x0000_s1027" name="Acrobat Document" r:id="rId3" imgW="6415686" imgH="4533529" progId="AcroExch.Document.DC">
                   <p:embed/>
                 </p:oleObj>
               </mc:Choice>
@@ -6701,10 +6701,10 @@
       </p:grpSpPr>
       <p:pic>
         <p:nvPicPr>
-          <p:cNvPr id="6" name="Grafik 5">
+          <p:cNvPr id="4" name="Grafik 3">
             <a:extLst>
               <a:ext uri="{FF2B5EF4-FFF2-40B4-BE49-F238E27FC236}">
-                <a16:creationId xmlns:a16="http://schemas.microsoft.com/office/drawing/2014/main" id="{284377E6-4EA8-4475-A4D2-EF3EDBF8C04A}"/>
+                <a16:creationId xmlns:a16="http://schemas.microsoft.com/office/drawing/2014/main" id="{D943377C-E668-459C-B85A-35BCC84F47C4}"/>
               </a:ext>
             </a:extLst>
           </p:cNvPr>
@@ -6727,8 +6727,8 @@
         </p:blipFill>
         <p:spPr>
           <a:xfrm>
-            <a:off x="825889" y="95655"/>
-            <a:ext cx="10540222" cy="6666690"/>
+            <a:off x="840000" y="98275"/>
+            <a:ext cx="10511999" cy="6661450"/>
           </a:xfrm>
           <a:prstGeom prst="rect">
             <a:avLst/>

</xml_diff>